<commit_message>
Mod printResults. Move puzzle loop from solvePuzzle to main. Add function getGuesses.
</commit_message>
<xml_diff>
--- a/docs/prunning.pptx
+++ b/docs/prunning.pptx
@@ -270,7 +270,7 @@
           <a:p>
             <a:fld id="{1F274930-2381-46E1-B0AC-06AFA971923E}" type="datetimeFigureOut">
               <a:rPr lang="en-US" smtClean="0"/>
-              <a:t>2/15/2024</a:t>
+              <a:t>2/17/2024</a:t>
             </a:fld>
             <a:endParaRPr lang="en-US" dirty="0"/>
           </a:p>
@@ -468,7 +468,7 @@
           <a:p>
             <a:fld id="{1F274930-2381-46E1-B0AC-06AFA971923E}" type="datetimeFigureOut">
               <a:rPr lang="en-US" smtClean="0"/>
-              <a:t>2/15/2024</a:t>
+              <a:t>2/17/2024</a:t>
             </a:fld>
             <a:endParaRPr lang="en-US" dirty="0"/>
           </a:p>
@@ -676,7 +676,7 @@
           <a:p>
             <a:fld id="{1F274930-2381-46E1-B0AC-06AFA971923E}" type="datetimeFigureOut">
               <a:rPr lang="en-US" smtClean="0"/>
-              <a:t>2/15/2024</a:t>
+              <a:t>2/17/2024</a:t>
             </a:fld>
             <a:endParaRPr lang="en-US" dirty="0"/>
           </a:p>
@@ -874,7 +874,7 @@
           <a:p>
             <a:fld id="{1F274930-2381-46E1-B0AC-06AFA971923E}" type="datetimeFigureOut">
               <a:rPr lang="en-US" smtClean="0"/>
-              <a:t>2/15/2024</a:t>
+              <a:t>2/17/2024</a:t>
             </a:fld>
             <a:endParaRPr lang="en-US" dirty="0"/>
           </a:p>
@@ -1149,7 +1149,7 @@
           <a:p>
             <a:fld id="{1F274930-2381-46E1-B0AC-06AFA971923E}" type="datetimeFigureOut">
               <a:rPr lang="en-US" smtClean="0"/>
-              <a:t>2/15/2024</a:t>
+              <a:t>2/17/2024</a:t>
             </a:fld>
             <a:endParaRPr lang="en-US" dirty="0"/>
           </a:p>
@@ -1414,7 +1414,7 @@
           <a:p>
             <a:fld id="{1F274930-2381-46E1-B0AC-06AFA971923E}" type="datetimeFigureOut">
               <a:rPr lang="en-US" smtClean="0"/>
-              <a:t>2/15/2024</a:t>
+              <a:t>2/17/2024</a:t>
             </a:fld>
             <a:endParaRPr lang="en-US" dirty="0"/>
           </a:p>
@@ -1826,7 +1826,7 @@
           <a:p>
             <a:fld id="{1F274930-2381-46E1-B0AC-06AFA971923E}" type="datetimeFigureOut">
               <a:rPr lang="en-US" smtClean="0"/>
-              <a:t>2/15/2024</a:t>
+              <a:t>2/17/2024</a:t>
             </a:fld>
             <a:endParaRPr lang="en-US" dirty="0"/>
           </a:p>
@@ -1967,7 +1967,7 @@
           <a:p>
             <a:fld id="{1F274930-2381-46E1-B0AC-06AFA971923E}" type="datetimeFigureOut">
               <a:rPr lang="en-US" smtClean="0"/>
-              <a:t>2/15/2024</a:t>
+              <a:t>2/17/2024</a:t>
             </a:fld>
             <a:endParaRPr lang="en-US" dirty="0"/>
           </a:p>
@@ -2080,7 +2080,7 @@
           <a:p>
             <a:fld id="{1F274930-2381-46E1-B0AC-06AFA971923E}" type="datetimeFigureOut">
               <a:rPr lang="en-US" smtClean="0"/>
-              <a:t>2/15/2024</a:t>
+              <a:t>2/17/2024</a:t>
             </a:fld>
             <a:endParaRPr lang="en-US" dirty="0"/>
           </a:p>
@@ -2391,7 +2391,7 @@
           <a:p>
             <a:fld id="{1F274930-2381-46E1-B0AC-06AFA971923E}" type="datetimeFigureOut">
               <a:rPr lang="en-US" smtClean="0"/>
-              <a:t>2/15/2024</a:t>
+              <a:t>2/17/2024</a:t>
             </a:fld>
             <a:endParaRPr lang="en-US" dirty="0"/>
           </a:p>
@@ -2679,7 +2679,7 @@
           <a:p>
             <a:fld id="{1F274930-2381-46E1-B0AC-06AFA971923E}" type="datetimeFigureOut">
               <a:rPr lang="en-US" smtClean="0"/>
-              <a:t>2/15/2024</a:t>
+              <a:t>2/17/2024</a:t>
             </a:fld>
             <a:endParaRPr lang="en-US" dirty="0"/>
           </a:p>
@@ -2920,7 +2920,7 @@
           <a:p>
             <a:fld id="{1F274930-2381-46E1-B0AC-06AFA971923E}" type="datetimeFigureOut">
               <a:rPr lang="en-US" smtClean="0"/>
-              <a:t>2/15/2024</a:t>
+              <a:t>2/17/2024</a:t>
             </a:fld>
             <a:endParaRPr lang="en-US" dirty="0"/>
           </a:p>
@@ -3367,8 +3367,12 @@
           <a:p>
             <a:pPr algn="ctr"/>
             <a:r>
+              <a:rPr lang="en-US" sz="5400"/>
+              <a:t> Python </a:t>
+            </a:r>
+            <a:r>
               <a:rPr lang="en-US" sz="5400" dirty="0"/>
-              <a:t>Python Sudoku Program - Overview</a:t>
+              <a:t>Sudoku Program - Overview</a:t>
             </a:r>
           </a:p>
         </p:txBody>

</xml_diff>

<commit_message>
Add guess cnt to puzzle dict. Can't guess and characterize at same time. Update docs.
</commit_message>
<xml_diff>
--- a/docs/prunning.pptx
+++ b/docs/prunning.pptx
@@ -17,6 +17,7 @@
     <p:sldId id="260" r:id="rId11"/>
     <p:sldId id="261" r:id="rId12"/>
     <p:sldId id="267" r:id="rId13"/>
+    <p:sldId id="268" r:id="rId14"/>
   </p:sldIdLst>
   <p:sldSz cx="12192000" cy="6858000"/>
   <p:notesSz cx="6858000" cy="9144000"/>
@@ -270,7 +271,7 @@
           <a:p>
             <a:fld id="{1F274930-2381-46E1-B0AC-06AFA971923E}" type="datetimeFigureOut">
               <a:rPr lang="en-US" smtClean="0"/>
-              <a:t>2/17/2024</a:t>
+              <a:t>2/26/2024</a:t>
             </a:fld>
             <a:endParaRPr lang="en-US" dirty="0"/>
           </a:p>
@@ -468,7 +469,7 @@
           <a:p>
             <a:fld id="{1F274930-2381-46E1-B0AC-06AFA971923E}" type="datetimeFigureOut">
               <a:rPr lang="en-US" smtClean="0"/>
-              <a:t>2/17/2024</a:t>
+              <a:t>2/26/2024</a:t>
             </a:fld>
             <a:endParaRPr lang="en-US" dirty="0"/>
           </a:p>
@@ -676,7 +677,7 @@
           <a:p>
             <a:fld id="{1F274930-2381-46E1-B0AC-06AFA971923E}" type="datetimeFigureOut">
               <a:rPr lang="en-US" smtClean="0"/>
-              <a:t>2/17/2024</a:t>
+              <a:t>2/26/2024</a:t>
             </a:fld>
             <a:endParaRPr lang="en-US" dirty="0"/>
           </a:p>
@@ -874,7 +875,7 @@
           <a:p>
             <a:fld id="{1F274930-2381-46E1-B0AC-06AFA971923E}" type="datetimeFigureOut">
               <a:rPr lang="en-US" smtClean="0"/>
-              <a:t>2/17/2024</a:t>
+              <a:t>2/26/2024</a:t>
             </a:fld>
             <a:endParaRPr lang="en-US" dirty="0"/>
           </a:p>
@@ -1149,7 +1150,7 @@
           <a:p>
             <a:fld id="{1F274930-2381-46E1-B0AC-06AFA971923E}" type="datetimeFigureOut">
               <a:rPr lang="en-US" smtClean="0"/>
-              <a:t>2/17/2024</a:t>
+              <a:t>2/26/2024</a:t>
             </a:fld>
             <a:endParaRPr lang="en-US" dirty="0"/>
           </a:p>
@@ -1414,7 +1415,7 @@
           <a:p>
             <a:fld id="{1F274930-2381-46E1-B0AC-06AFA971923E}" type="datetimeFigureOut">
               <a:rPr lang="en-US" smtClean="0"/>
-              <a:t>2/17/2024</a:t>
+              <a:t>2/26/2024</a:t>
             </a:fld>
             <a:endParaRPr lang="en-US" dirty="0"/>
           </a:p>
@@ -1826,7 +1827,7 @@
           <a:p>
             <a:fld id="{1F274930-2381-46E1-B0AC-06AFA971923E}" type="datetimeFigureOut">
               <a:rPr lang="en-US" smtClean="0"/>
-              <a:t>2/17/2024</a:t>
+              <a:t>2/26/2024</a:t>
             </a:fld>
             <a:endParaRPr lang="en-US" dirty="0"/>
           </a:p>
@@ -1967,7 +1968,7 @@
           <a:p>
             <a:fld id="{1F274930-2381-46E1-B0AC-06AFA971923E}" type="datetimeFigureOut">
               <a:rPr lang="en-US" smtClean="0"/>
-              <a:t>2/17/2024</a:t>
+              <a:t>2/26/2024</a:t>
             </a:fld>
             <a:endParaRPr lang="en-US" dirty="0"/>
           </a:p>
@@ -2080,7 +2081,7 @@
           <a:p>
             <a:fld id="{1F274930-2381-46E1-B0AC-06AFA971923E}" type="datetimeFigureOut">
               <a:rPr lang="en-US" smtClean="0"/>
-              <a:t>2/17/2024</a:t>
+              <a:t>2/26/2024</a:t>
             </a:fld>
             <a:endParaRPr lang="en-US" dirty="0"/>
           </a:p>
@@ -2391,7 +2392,7 @@
           <a:p>
             <a:fld id="{1F274930-2381-46E1-B0AC-06AFA971923E}" type="datetimeFigureOut">
               <a:rPr lang="en-US" smtClean="0"/>
-              <a:t>2/17/2024</a:t>
+              <a:t>2/26/2024</a:t>
             </a:fld>
             <a:endParaRPr lang="en-US" dirty="0"/>
           </a:p>
@@ -2679,7 +2680,7 @@
           <a:p>
             <a:fld id="{1F274930-2381-46E1-B0AC-06AFA971923E}" type="datetimeFigureOut">
               <a:rPr lang="en-US" smtClean="0"/>
-              <a:t>2/17/2024</a:t>
+              <a:t>2/26/2024</a:t>
             </a:fld>
             <a:endParaRPr lang="en-US" dirty="0"/>
           </a:p>
@@ -2920,7 +2921,7 @@
           <a:p>
             <a:fld id="{1F274930-2381-46E1-B0AC-06AFA971923E}" type="datetimeFigureOut">
               <a:rPr lang="en-US" smtClean="0"/>
-              <a:t>2/17/2024</a:t>
+              <a:t>2/26/2024</a:t>
             </a:fld>
             <a:endParaRPr lang="en-US" dirty="0"/>
           </a:p>
@@ -5229,6 +5230,340 @@
 </p:sld>
 </file>
 
+<file path=ppt/slides/slide13.xml><?xml version="1.0" encoding="utf-8"?>
+<p:sld xmlns:a="http://schemas.openxmlformats.org/drawingml/2006/main" xmlns:r="http://schemas.openxmlformats.org/officeDocument/2006/relationships" xmlns:p="http://schemas.openxmlformats.org/presentationml/2006/main">
+  <p:cSld>
+    <p:spTree>
+      <p:nvGrpSpPr>
+        <p:cNvPr id="1" name="">
+          <a:extLst>
+            <a:ext uri="{FF2B5EF4-FFF2-40B4-BE49-F238E27FC236}">
+              <a16:creationId xmlns:a16="http://schemas.microsoft.com/office/drawing/2014/main" id="{EE66FD6F-9226-3B3C-EFA4-1646C6B7881E}"/>
+            </a:ext>
+          </a:extLst>
+        </p:cNvPr>
+        <p:cNvGrpSpPr/>
+        <p:nvPr/>
+      </p:nvGrpSpPr>
+      <p:grpSpPr>
+        <a:xfrm>
+          <a:off x="0" y="0"/>
+          <a:ext cx="0" cy="0"/>
+          <a:chOff x="0" y="0"/>
+          <a:chExt cx="0" cy="0"/>
+        </a:xfrm>
+      </p:grpSpPr>
+      <p:pic>
+        <p:nvPicPr>
+          <p:cNvPr id="18" name="Picture 17">
+            <a:extLst>
+              <a:ext uri="{FF2B5EF4-FFF2-40B4-BE49-F238E27FC236}">
+                <a16:creationId xmlns:a16="http://schemas.microsoft.com/office/drawing/2014/main" id="{958D989F-82C1-0BA1-C980-A4B2AE5C594D}"/>
+              </a:ext>
+            </a:extLst>
+          </p:cNvPr>
+          <p:cNvPicPr>
+            <a:picLocks noChangeAspect="1"/>
+          </p:cNvPicPr>
+          <p:nvPr/>
+        </p:nvPicPr>
+        <p:blipFill>
+          <a:blip r:embed="rId2"/>
+          <a:stretch>
+            <a:fillRect/>
+          </a:stretch>
+        </p:blipFill>
+        <p:spPr>
+          <a:xfrm>
+            <a:off x="311635" y="738092"/>
+            <a:ext cx="6315075" cy="4410075"/>
+          </a:xfrm>
+          <a:prstGeom prst="rect">
+            <a:avLst/>
+          </a:prstGeom>
+          <a:ln w="12700">
+            <a:solidFill>
+              <a:schemeClr val="tx1"/>
+            </a:solidFill>
+          </a:ln>
+        </p:spPr>
+      </p:pic>
+      <p:sp>
+        <p:nvSpPr>
+          <p:cNvPr id="2" name="Title 1">
+            <a:extLst>
+              <a:ext uri="{FF2B5EF4-FFF2-40B4-BE49-F238E27FC236}">
+                <a16:creationId xmlns:a16="http://schemas.microsoft.com/office/drawing/2014/main" id="{67A9802E-487F-4C95-B8B1-8E1B255CC859}"/>
+              </a:ext>
+            </a:extLst>
+          </p:cNvPr>
+          <p:cNvSpPr>
+            <a:spLocks noGrp="1"/>
+          </p:cNvSpPr>
+          <p:nvPr>
+            <p:ph type="title"/>
+          </p:nvPr>
+        </p:nvSpPr>
+        <p:spPr>
+          <a:xfrm>
+            <a:off x="838200" y="69851"/>
+            <a:ext cx="10515600" cy="530224"/>
+          </a:xfrm>
+        </p:spPr>
+        <p:txBody>
+          <a:bodyPr>
+            <a:normAutofit fontScale="90000"/>
+          </a:bodyPr>
+          <a:lstStyle/>
+          <a:p>
+            <a:pPr algn="ctr"/>
+            <a:r>
+              <a:rPr lang="en-US" sz="5400" dirty="0"/>
+              <a:t>Guessing</a:t>
+            </a:r>
+          </a:p>
+        </p:txBody>
+      </p:sp>
+      <p:pic>
+        <p:nvPicPr>
+          <p:cNvPr id="10" name="Picture 9">
+            <a:extLst>
+              <a:ext uri="{FF2B5EF4-FFF2-40B4-BE49-F238E27FC236}">
+                <a16:creationId xmlns:a16="http://schemas.microsoft.com/office/drawing/2014/main" id="{267D2F41-FAB0-D6E2-2EF7-11CC1D1BB576}"/>
+              </a:ext>
+            </a:extLst>
+          </p:cNvPr>
+          <p:cNvPicPr>
+            <a:picLocks noChangeAspect="1"/>
+          </p:cNvPicPr>
+          <p:nvPr/>
+        </p:nvPicPr>
+        <p:blipFill>
+          <a:blip r:embed="rId3"/>
+          <a:stretch>
+            <a:fillRect/>
+          </a:stretch>
+        </p:blipFill>
+        <p:spPr>
+          <a:xfrm>
+            <a:off x="7415126" y="767483"/>
+            <a:ext cx="2914650" cy="3209925"/>
+          </a:xfrm>
+          <a:prstGeom prst="rect">
+            <a:avLst/>
+          </a:prstGeom>
+          <a:ln w="12700">
+            <a:solidFill>
+              <a:schemeClr val="tx1"/>
+            </a:solidFill>
+          </a:ln>
+        </p:spPr>
+      </p:pic>
+      <p:sp>
+        <p:nvSpPr>
+          <p:cNvPr id="11" name="Oval 10">
+            <a:extLst>
+              <a:ext uri="{FF2B5EF4-FFF2-40B4-BE49-F238E27FC236}">
+                <a16:creationId xmlns:a16="http://schemas.microsoft.com/office/drawing/2014/main" id="{6C45A75A-AD79-3D19-4560-89C8201F35B5}"/>
+              </a:ext>
+            </a:extLst>
+          </p:cNvPr>
+          <p:cNvSpPr/>
+          <p:nvPr/>
+        </p:nvSpPr>
+        <p:spPr>
+          <a:xfrm>
+            <a:off x="2034974" y="1040114"/>
+            <a:ext cx="401868" cy="444124"/>
+          </a:xfrm>
+          <a:prstGeom prst="ellipse">
+            <a:avLst/>
+          </a:prstGeom>
+          <a:solidFill>
+            <a:schemeClr val="accent6">
+              <a:alpha val="24000"/>
+            </a:schemeClr>
+          </a:solidFill>
+        </p:spPr>
+        <p:style>
+          <a:lnRef idx="2">
+            <a:schemeClr val="accent1">
+              <a:shade val="15000"/>
+            </a:schemeClr>
+          </a:lnRef>
+          <a:fillRef idx="1">
+            <a:schemeClr val="accent1"/>
+          </a:fillRef>
+          <a:effectRef idx="0">
+            <a:schemeClr val="accent1"/>
+          </a:effectRef>
+          <a:fontRef idx="minor">
+            <a:schemeClr val="lt1"/>
+          </a:fontRef>
+        </p:style>
+        <p:txBody>
+          <a:bodyPr rtlCol="0" anchor="ctr"/>
+          <a:lstStyle/>
+          <a:p>
+            <a:pPr algn="ctr"/>
+            <a:endParaRPr lang="en-US" dirty="0"/>
+          </a:p>
+        </p:txBody>
+      </p:sp>
+      <p:sp>
+        <p:nvSpPr>
+          <p:cNvPr id="12" name="Oval 11">
+            <a:extLst>
+              <a:ext uri="{FF2B5EF4-FFF2-40B4-BE49-F238E27FC236}">
+                <a16:creationId xmlns:a16="http://schemas.microsoft.com/office/drawing/2014/main" id="{AEB48625-EFD8-20D2-FE76-CAFC1E324B9C}"/>
+              </a:ext>
+            </a:extLst>
+          </p:cNvPr>
+          <p:cNvSpPr/>
+          <p:nvPr/>
+        </p:nvSpPr>
+        <p:spPr>
+          <a:xfrm>
+            <a:off x="1048530" y="1416717"/>
+            <a:ext cx="401868" cy="444124"/>
+          </a:xfrm>
+          <a:prstGeom prst="ellipse">
+            <a:avLst/>
+          </a:prstGeom>
+          <a:solidFill>
+            <a:schemeClr val="accent6">
+              <a:alpha val="24000"/>
+            </a:schemeClr>
+          </a:solidFill>
+        </p:spPr>
+        <p:style>
+          <a:lnRef idx="2">
+            <a:schemeClr val="accent1">
+              <a:shade val="15000"/>
+            </a:schemeClr>
+          </a:lnRef>
+          <a:fillRef idx="1">
+            <a:schemeClr val="accent1"/>
+          </a:fillRef>
+          <a:effectRef idx="0">
+            <a:schemeClr val="accent1"/>
+          </a:effectRef>
+          <a:fontRef idx="minor">
+            <a:schemeClr val="lt1"/>
+          </a:fontRef>
+        </p:style>
+        <p:txBody>
+          <a:bodyPr rtlCol="0" anchor="ctr"/>
+          <a:lstStyle/>
+          <a:p>
+            <a:pPr algn="ctr"/>
+            <a:endParaRPr lang="en-US" dirty="0"/>
+          </a:p>
+        </p:txBody>
+      </p:sp>
+      <p:sp>
+        <p:nvSpPr>
+          <p:cNvPr id="13" name="Oval 12">
+            <a:extLst>
+              <a:ext uri="{FF2B5EF4-FFF2-40B4-BE49-F238E27FC236}">
+                <a16:creationId xmlns:a16="http://schemas.microsoft.com/office/drawing/2014/main" id="{E72BACD4-CB3F-A96E-4AF8-5855B47016E7}"/>
+              </a:ext>
+            </a:extLst>
+          </p:cNvPr>
+          <p:cNvSpPr/>
+          <p:nvPr/>
+        </p:nvSpPr>
+        <p:spPr>
+          <a:xfrm>
+            <a:off x="2399261" y="1794905"/>
+            <a:ext cx="401868" cy="444124"/>
+          </a:xfrm>
+          <a:prstGeom prst="ellipse">
+            <a:avLst/>
+          </a:prstGeom>
+          <a:solidFill>
+            <a:schemeClr val="accent6">
+              <a:alpha val="24000"/>
+            </a:schemeClr>
+          </a:solidFill>
+        </p:spPr>
+        <p:style>
+          <a:lnRef idx="2">
+            <a:schemeClr val="accent1">
+              <a:shade val="15000"/>
+            </a:schemeClr>
+          </a:lnRef>
+          <a:fillRef idx="1">
+            <a:schemeClr val="accent1"/>
+          </a:fillRef>
+          <a:effectRef idx="0">
+            <a:schemeClr val="accent1"/>
+          </a:effectRef>
+          <a:fontRef idx="minor">
+            <a:schemeClr val="lt1"/>
+          </a:fontRef>
+        </p:style>
+        <p:txBody>
+          <a:bodyPr rtlCol="0" anchor="ctr"/>
+          <a:lstStyle/>
+          <a:p>
+            <a:pPr algn="ctr"/>
+            <a:endParaRPr lang="en-US" dirty="0"/>
+          </a:p>
+        </p:txBody>
+      </p:sp>
+      <p:sp>
+        <p:nvSpPr>
+          <p:cNvPr id="21" name="TextBox 20">
+            <a:extLst>
+              <a:ext uri="{FF2B5EF4-FFF2-40B4-BE49-F238E27FC236}">
+                <a16:creationId xmlns:a16="http://schemas.microsoft.com/office/drawing/2014/main" id="{31AC4939-CB01-0A9A-0AA9-1083AD645008}"/>
+              </a:ext>
+            </a:extLst>
+          </p:cNvPr>
+          <p:cNvSpPr txBox="1"/>
+          <p:nvPr/>
+        </p:nvSpPr>
+        <p:spPr>
+          <a:xfrm>
+            <a:off x="7377802" y="4124123"/>
+            <a:ext cx="3007168" cy="923330"/>
+          </a:xfrm>
+          <a:prstGeom prst="rect">
+            <a:avLst/>
+          </a:prstGeom>
+          <a:ln w="12700">
+            <a:solidFill>
+              <a:schemeClr val="tx1"/>
+            </a:solidFill>
+          </a:ln>
+        </p:spPr>
+        <p:txBody>
+          <a:bodyPr wrap="square" rtlCol="0">
+            <a:spAutoFit/>
+          </a:bodyPr>
+          <a:lstStyle/>
+          <a:p>
+            <a:r>
+              <a:rPr lang="en-US" dirty="0"/>
+              <a:t>Find three cells all in different rows, cols and squares but all in the same “row of squares”.</a:t>
+            </a:r>
+          </a:p>
+        </p:txBody>
+      </p:sp>
+    </p:spTree>
+    <p:extLst>
+      <p:ext uri="{BB962C8B-B14F-4D97-AF65-F5344CB8AC3E}">
+        <p14:creationId xmlns:p14="http://schemas.microsoft.com/office/powerpoint/2010/main" val="1361487455"/>
+      </p:ext>
+    </p:extLst>
+  </p:cSld>
+  <p:clrMapOvr>
+    <a:masterClrMapping/>
+  </p:clrMapOvr>
+</p:sld>
+</file>
+
 <file path=ppt/slides/slide2.xml><?xml version="1.0" encoding="utf-8"?>
 <p:sld xmlns:a="http://schemas.openxmlformats.org/drawingml/2006/main" xmlns:r="http://schemas.openxmlformats.org/officeDocument/2006/relationships" xmlns:p="http://schemas.openxmlformats.org/presentationml/2006/main">
   <p:cSld>

</xml_diff>